<commit_message>
minor presentation changes, and index.js changes
</commit_message>
<xml_diff>
--- a/doc/DOM.pptx
+++ b/doc/DOM.pptx
@@ -35017,7 +35017,7 @@
           </a:prstGeom>
         </p:spPr>
         <p:txBody>
-          <a:bodyPr spcFirstLastPara="1" wrap="square" lIns="91424" tIns="91424" rIns="91424" bIns="91424" anchor="ctr" anchorCtr="0">
+          <a:bodyPr spcFirstLastPara="1" wrap="square" lIns="91423" tIns="91423" rIns="91423" bIns="91423" anchor="ctr" anchorCtr="0">
             <a:noAutofit/>
           </a:bodyPr>
           <a:lstStyle/>
@@ -35103,7 +35103,7 @@
         </p:nvSpPr>
         <p:spPr bwMode="auto">
           <a:xfrm>
-            <a:off x="710124" y="1800487"/>
+            <a:off x="710124" y="1800486"/>
             <a:ext cx="506100" cy="646500"/>
           </a:xfrm>
           <a:prstGeom prst="rect">
@@ -35223,7 +35223,7 @@
         </p:nvSpPr>
         <p:spPr bwMode="auto">
           <a:xfrm flipH="1">
-            <a:off x="1460449" y="1267512"/>
+            <a:off x="1501862" y="1226098"/>
             <a:ext cx="872100" cy="338400"/>
           </a:xfrm>
           <a:prstGeom prst="rect">
@@ -35264,15 +35264,15 @@
         </p:nvSpPr>
         <p:spPr bwMode="auto">
           <a:xfrm flipH="0" flipV="0">
-            <a:off x="2332549" y="1605912"/>
-            <a:ext cx="6101299" cy="813948"/>
-          </a:xfrm>
-          <a:prstGeom prst="rect">
-            <a:avLst/>
-          </a:prstGeom>
-        </p:spPr>
-        <p:txBody>
-          <a:bodyPr spcFirstLastPara="1" wrap="square" lIns="91424" tIns="91424" rIns="91424" bIns="91424" anchor="ctr" anchorCtr="0">
+            <a:off x="2373962" y="1647324"/>
+            <a:ext cx="6101298" cy="1518719"/>
+          </a:xfrm>
+          <a:prstGeom prst="rect">
+            <a:avLst/>
+          </a:prstGeom>
+        </p:spPr>
+        <p:txBody>
+          <a:bodyPr spcFirstLastPara="1" wrap="square" lIns="91423" tIns="91423" rIns="91423" bIns="91423" anchor="ctr" anchorCtr="0">
             <a:noAutofit/>
           </a:bodyPr>
           <a:lstStyle/>
@@ -35303,11 +35303,24 @@
             </a:r>
             <a:r>
               <a:rPr lang="en"/>
-              <a:t> &gt;	</a:t>
-            </a:r>
+              <a:t> &gt;</a:t>
+            </a:r>
+            <a:endParaRPr lang="en"/>
+          </a:p>
+          <a:p>
+            <a:pPr marL="0" lvl="0" indent="0" algn="l">
+              <a:spcBef>
+                <a:spcPts val="0"/>
+              </a:spcBef>
+              <a:spcAft>
+                <a:spcPts val="0"/>
+              </a:spcAft>
+              <a:buNone/>
+              <a:defRPr/>
+            </a:pPr>
             <a:r>
               <a:rPr lang="en"/>
-              <a:t> &lt; DOM Structure &gt;</a:t>
+              <a:t>&lt; DOM Structure &gt;</a:t>
             </a:r>
             <a:endParaRPr lang="en"/>
           </a:p>
@@ -35324,8 +35337,21 @@
             </a:pPr>
             <a:r>
               <a:rPr lang="en"/>
-              <a:t>&lt; DOM API &gt;		</a:t>
-            </a:r>
+              <a:t>&lt; DOM API &gt;</a:t>
+            </a:r>
+            <a:endParaRPr lang="en"/>
+          </a:p>
+          <a:p>
+            <a:pPr marL="0" lvl="0" indent="0" algn="l">
+              <a:spcBef>
+                <a:spcPts val="0"/>
+              </a:spcBef>
+              <a:spcAft>
+                <a:spcPts val="0"/>
+              </a:spcAft>
+              <a:buNone/>
+              <a:defRPr/>
+            </a:pPr>
             <a:r>
               <a:rPr lang="en"/>
               <a:t>&lt; Documnet Interface &gt;</a:t>
@@ -35345,8 +35371,21 @@
             </a:pPr>
             <a:r>
               <a:rPr lang="en"/>
-              <a:t>&lt; Element Interface &gt;		</a:t>
-            </a:r>
+              <a:t>&lt; Element Interface &gt;</a:t>
+            </a:r>
+            <a:endParaRPr lang="en"/>
+          </a:p>
+          <a:p>
+            <a:pPr marL="0" lvl="0" indent="0" algn="l">
+              <a:spcBef>
+                <a:spcPts val="0"/>
+              </a:spcBef>
+              <a:spcAft>
+                <a:spcPts val="0"/>
+              </a:spcAft>
+              <a:buNone/>
+              <a:defRPr/>
+            </a:pPr>
             <a:r>
               <a:rPr lang="en"/>
               <a:t>&lt; NodeList Interface &gt;</a:t>
@@ -35396,7 +35435,7 @@
         </p:nvSpPr>
         <p:spPr bwMode="auto">
           <a:xfrm>
-            <a:off x="2332549" y="1267512"/>
+            <a:off x="2373962" y="1226098"/>
             <a:ext cx="3129000" cy="338400"/>
           </a:xfrm>
           <a:prstGeom prst="rect">
@@ -35437,7 +35476,7 @@
         </p:nvSpPr>
         <p:spPr bwMode="auto">
           <a:xfrm flipH="1">
-            <a:off x="2850124" y="2586262"/>
+            <a:off x="2891536" y="3331696"/>
             <a:ext cx="872100" cy="338400"/>
           </a:xfrm>
           <a:prstGeom prst="rect">
@@ -35482,7 +35521,7 @@
         </p:nvSpPr>
         <p:spPr bwMode="auto">
           <a:xfrm flipH="0" flipV="0">
-            <a:off x="3728999" y="2924662"/>
+            <a:off x="3770411" y="3670096"/>
             <a:ext cx="4514974" cy="488099"/>
           </a:xfrm>
           <a:prstGeom prst="rect">
@@ -35490,7 +35529,7 @@
           </a:prstGeom>
         </p:spPr>
         <p:txBody>
-          <a:bodyPr spcFirstLastPara="1" wrap="square" lIns="91424" tIns="91424" rIns="91424" bIns="91424" anchor="ctr" anchorCtr="0">
+          <a:bodyPr spcFirstLastPara="1" wrap="square" lIns="91423" tIns="91423" rIns="91423" bIns="91423" anchor="ctr" anchorCtr="0">
             <a:noAutofit/>
           </a:bodyPr>
           <a:lstStyle/>
@@ -35527,7 +35566,7 @@
         </p:nvSpPr>
         <p:spPr bwMode="auto">
           <a:xfrm>
-            <a:off x="3722224" y="2586262"/>
+            <a:off x="3763636" y="3331696"/>
             <a:ext cx="3129000" cy="338400"/>
           </a:xfrm>
           <a:prstGeom prst="rect">
@@ -35553,133 +35592,6 @@
             <a:r>
               <a:rPr lang="en"/>
               <a:t>Features of the Topic</a:t>
-            </a:r>
-            <a:endParaRPr/>
-          </a:p>
-        </p:txBody>
-      </p:sp>
-      <p:sp>
-        <p:nvSpPr>
-          <p:cNvPr id="486" name="Google Shape;486;p29"/>
-          <p:cNvSpPr txBox="1"/>
-          <p:nvPr>
-            <p:ph type="title" idx="6"/>
-          </p:nvPr>
-        </p:nvSpPr>
-        <p:spPr bwMode="auto">
-          <a:xfrm flipH="1">
-            <a:off x="4242875" y="3400212"/>
-            <a:ext cx="872100" cy="338400"/>
-          </a:xfrm>
-          <a:prstGeom prst="rect">
-            <a:avLst/>
-          </a:prstGeom>
-        </p:spPr>
-        <p:txBody>
-          <a:bodyPr spcFirstLastPara="1" wrap="square" lIns="91425" tIns="91425" rIns="91425" bIns="91425" anchor="ctr" anchorCtr="0">
-            <a:noAutofit/>
-          </a:bodyPr>
-          <a:lstStyle/>
-          <a:p>
-            <a:pPr marL="0" lvl="0" indent="0" algn="ctr">
-              <a:spcBef>
-                <a:spcPts val="0"/>
-              </a:spcBef>
-              <a:spcAft>
-                <a:spcPts val="0"/>
-              </a:spcAft>
-              <a:buNone/>
-              <a:defRPr/>
-            </a:pPr>
-            <a:r>
-              <a:rPr lang="en"/>
-              <a:t>03</a:t>
-            </a:r>
-            <a:endParaRPr/>
-          </a:p>
-        </p:txBody>
-      </p:sp>
-      <p:sp>
-        <p:nvSpPr>
-          <p:cNvPr id="487" name="Google Shape;487;p29"/>
-          <p:cNvSpPr txBox="1"/>
-          <p:nvPr>
-            <p:ph type="subTitle" idx="7"/>
-          </p:nvPr>
-        </p:nvSpPr>
-        <p:spPr bwMode="auto">
-          <a:xfrm flipH="0" flipV="0">
-            <a:off x="5114974" y="3738592"/>
-            <a:ext cx="3922198" cy="488099"/>
-          </a:xfrm>
-          <a:prstGeom prst="rect">
-            <a:avLst/>
-          </a:prstGeom>
-        </p:spPr>
-        <p:txBody>
-          <a:bodyPr spcFirstLastPara="1" wrap="square" lIns="91424" tIns="91424" rIns="91424" bIns="91424" anchor="ctr" anchorCtr="0">
-            <a:noAutofit/>
-          </a:bodyPr>
-          <a:lstStyle/>
-          <a:p>
-            <a:pPr marL="0" lvl="0" indent="0" algn="l">
-              <a:spcBef>
-                <a:spcPts val="0"/>
-              </a:spcBef>
-              <a:spcAft>
-                <a:spcPts val="0"/>
-              </a:spcAft>
-              <a:buNone/>
-              <a:defRPr/>
-            </a:pPr>
-            <a:r>
-              <a:rPr lang="en"/>
-              <a:t>&lt; </a:t>
-            </a:r>
-            <a:r>
-              <a:rPr lang="en"/>
-              <a:t>Complete exercises in project &gt;</a:t>
-            </a:r>
-            <a:endParaRPr/>
-          </a:p>
-        </p:txBody>
-      </p:sp>
-      <p:sp>
-        <p:nvSpPr>
-          <p:cNvPr id="488" name="Google Shape;488;p29"/>
-          <p:cNvSpPr txBox="1"/>
-          <p:nvPr>
-            <p:ph type="subTitle" idx="8"/>
-          </p:nvPr>
-        </p:nvSpPr>
-        <p:spPr bwMode="auto">
-          <a:xfrm>
-            <a:off x="5114975" y="3400200"/>
-            <a:ext cx="3129000" cy="338400"/>
-          </a:xfrm>
-          <a:prstGeom prst="rect">
-            <a:avLst/>
-          </a:prstGeom>
-        </p:spPr>
-        <p:txBody>
-          <a:bodyPr spcFirstLastPara="1" wrap="square" lIns="91425" tIns="91425" rIns="91425" bIns="91425" anchor="ctr" anchorCtr="0">
-            <a:noAutofit/>
-          </a:bodyPr>
-          <a:lstStyle/>
-          <a:p>
-            <a:pPr marL="0" lvl="0" indent="0" algn="l">
-              <a:spcBef>
-                <a:spcPts val="0"/>
-              </a:spcBef>
-              <a:spcAft>
-                <a:spcPts val="0"/>
-              </a:spcAft>
-              <a:buNone/>
-              <a:defRPr/>
-            </a:pPr>
-            <a:r>
-              <a:rPr lang="en"/>
-              <a:t>Practical Exercise</a:t>
             </a:r>
             <a:endParaRPr/>
           </a:p>
@@ -36595,7 +36507,7 @@
         <p:spPr bwMode="auto">
           <a:xfrm flipH="0" flipV="0">
             <a:off x="2692695" y="3081130"/>
-            <a:ext cx="5648919" cy="518195"/>
+            <a:ext cx="5648918" cy="518195"/>
           </a:xfrm>
           <a:prstGeom prst="rect">
             <a:avLst/>
@@ -36794,14 +36706,14 @@
         <p:spPr bwMode="auto">
           <a:xfrm flipH="0" flipV="0">
             <a:off x="1661280" y="2197074"/>
-            <a:ext cx="3161003" cy="827112"/>
-          </a:xfrm>
-          <a:prstGeom prst="rect">
-            <a:avLst/>
-          </a:prstGeom>
-        </p:spPr>
-        <p:txBody>
-          <a:bodyPr spcFirstLastPara="1" wrap="square" lIns="91424" tIns="91424" rIns="91424" bIns="91424" anchor="ctr" anchorCtr="0">
+            <a:ext cx="3161003" cy="827111"/>
+          </a:xfrm>
+          <a:prstGeom prst="rect">
+            <a:avLst/>
+          </a:prstGeom>
+        </p:spPr>
+        <p:txBody>
+          <a:bodyPr spcFirstLastPara="1" wrap="square" lIns="91423" tIns="91423" rIns="91423" bIns="91423" anchor="ctr" anchorCtr="0">
             <a:noAutofit/>
           </a:bodyPr>
           <a:lstStyle/>
@@ -37535,7 +37447,7 @@
             <p:nvPr/>
           </p:nvCxnSpPr>
           <p:spPr bwMode="auto">
-            <a:xfrm rot="-5399978" flipH="1">
+            <a:xfrm rot="-5399977" flipH="1">
               <a:off x="1717196" y="81385"/>
               <a:ext cx="320718" cy="778554"/>
             </a:xfrm>
@@ -37565,7 +37477,7 @@
             <p:nvPr/>
           </p:nvCxnSpPr>
           <p:spPr bwMode="auto">
-            <a:xfrm rot="-5399978">
+            <a:xfrm rot="-5399977">
               <a:off x="938676" y="81026"/>
               <a:ext cx="320718" cy="778554"/>
             </a:xfrm>
@@ -37595,7 +37507,7 @@
             <p:nvPr/>
           </p:nvCxnSpPr>
           <p:spPr bwMode="auto">
-            <a:xfrm rot="-5399978" flipH="1">
+            <a:xfrm rot="-5399977" flipH="1">
               <a:off x="735341" y="915381"/>
               <a:ext cx="320718" cy="371884"/>
             </a:xfrm>
@@ -37625,7 +37537,7 @@
             <p:nvPr/>
           </p:nvCxnSpPr>
           <p:spPr bwMode="auto">
-            <a:xfrm rot="-5399978">
+            <a:xfrm rot="-5399977">
               <a:off x="363630" y="915024"/>
               <a:ext cx="320718" cy="371884"/>
             </a:xfrm>
@@ -37655,7 +37567,7 @@
             <p:nvPr/>
           </p:nvCxnSpPr>
           <p:spPr bwMode="auto">
-            <a:xfrm rot="-5399978" flipH="1">
+            <a:xfrm rot="-5399977" flipH="1">
               <a:off x="2292381" y="915381"/>
               <a:ext cx="320718" cy="371884"/>
             </a:xfrm>
@@ -37685,8 +37597,8 @@
             <p:nvPr/>
           </p:nvCxnSpPr>
           <p:spPr bwMode="auto">
-            <a:xfrm rot="-5399978">
-              <a:off x="1920672" y="915024"/>
+            <a:xfrm rot="-5399977">
+              <a:off x="1920671" y="915024"/>
               <a:ext cx="320718" cy="371884"/>
             </a:xfrm>
             <a:prstGeom prst="bentConnector3">
@@ -37715,7 +37627,7 @@
           <p:spPr bwMode="auto">
             <a:xfrm>
               <a:off x="0" y="1261325"/>
-              <a:ext cx="676095" cy="310300"/>
+              <a:ext cx="676095" cy="310299"/>
             </a:xfrm>
             <a:prstGeom prst="roundRect">
               <a:avLst>
@@ -37734,7 +37646,7 @@
             </a:ln>
           </p:spPr>
           <p:txBody>
-            <a:bodyPr spcFirstLastPara="1" wrap="square" lIns="91424" tIns="91424" rIns="91424" bIns="91424" anchor="ctr" anchorCtr="0">
+            <a:bodyPr spcFirstLastPara="1" wrap="square" lIns="91423" tIns="91423" rIns="91423" bIns="91423" anchor="ctr" anchorCtr="0">
               <a:noAutofit/>
             </a:bodyPr>
             <a:lstStyle/>
@@ -37774,7 +37686,7 @@
           <p:spPr bwMode="auto">
             <a:xfrm flipH="0" flipV="0">
               <a:off x="743424" y="1261325"/>
-              <a:ext cx="744854" cy="310300"/>
+              <a:ext cx="744854" cy="310299"/>
             </a:xfrm>
             <a:prstGeom prst="roundRect">
               <a:avLst>
@@ -37793,7 +37705,7 @@
             </a:ln>
           </p:spPr>
           <p:txBody>
-            <a:bodyPr spcFirstLastPara="1" wrap="square" lIns="91424" tIns="91424" rIns="91424" bIns="91424" anchor="ctr" anchorCtr="0">
+            <a:bodyPr spcFirstLastPara="1" wrap="square" lIns="91423" tIns="91423" rIns="91423" bIns="91423" anchor="ctr" anchorCtr="0">
               <a:noAutofit/>
             </a:bodyPr>
             <a:lstStyle/>
@@ -37833,7 +37745,7 @@
           <p:spPr bwMode="auto">
             <a:xfrm>
               <a:off x="1557041" y="1261325"/>
-              <a:ext cx="676095" cy="310300"/>
+              <a:ext cx="676095" cy="310299"/>
             </a:xfrm>
             <a:prstGeom prst="roundRect">
               <a:avLst>
@@ -37852,7 +37764,7 @@
             </a:ln>
           </p:spPr>
           <p:txBody>
-            <a:bodyPr spcFirstLastPara="1" wrap="square" lIns="91424" tIns="91424" rIns="91424" bIns="91424" anchor="ctr" anchorCtr="0">
+            <a:bodyPr spcFirstLastPara="1" wrap="square" lIns="91423" tIns="91423" rIns="91423" bIns="91423" anchor="ctr" anchorCtr="0">
               <a:noAutofit/>
             </a:bodyPr>
             <a:lstStyle/>
@@ -37892,7 +37804,7 @@
           <p:spPr bwMode="auto">
             <a:xfrm flipH="0" flipV="0">
               <a:off x="2300466" y="1261325"/>
-              <a:ext cx="739595" cy="310300"/>
+              <a:ext cx="739595" cy="310299"/>
             </a:xfrm>
             <a:prstGeom prst="roundRect">
               <a:avLst>
@@ -37911,7 +37823,7 @@
             </a:ln>
           </p:spPr>
           <p:txBody>
-            <a:bodyPr spcFirstLastPara="1" wrap="square" lIns="91424" tIns="91424" rIns="91424" bIns="91424" anchor="ctr" anchorCtr="0">
+            <a:bodyPr spcFirstLastPara="1" wrap="square" lIns="91423" tIns="91423" rIns="91423" bIns="91423" anchor="ctr" anchorCtr="0">
               <a:noAutofit/>
             </a:bodyPr>
             <a:lstStyle/>
@@ -37951,7 +37863,7 @@
           <p:spPr bwMode="auto">
             <a:xfrm flipH="0" flipV="0">
               <a:off x="1826326" y="630662"/>
-              <a:ext cx="864485" cy="310300"/>
+              <a:ext cx="864485" cy="310299"/>
             </a:xfrm>
             <a:prstGeom prst="roundRect">
               <a:avLst>
@@ -37970,7 +37882,7 @@
             </a:ln>
           </p:spPr>
           <p:txBody>
-            <a:bodyPr spcFirstLastPara="1" wrap="square" lIns="91424" tIns="91424" rIns="91424" bIns="91424" anchor="ctr" anchorCtr="0">
+            <a:bodyPr spcFirstLastPara="1" wrap="square" lIns="91423" tIns="91423" rIns="91423" bIns="91423" anchor="ctr" anchorCtr="0">
               <a:noAutofit/>
             </a:bodyPr>
             <a:lstStyle/>
@@ -38010,7 +37922,7 @@
           <p:spPr bwMode="auto">
             <a:xfrm>
               <a:off x="371711" y="630662"/>
-              <a:ext cx="676095" cy="310300"/>
+              <a:ext cx="676095" cy="310299"/>
             </a:xfrm>
             <a:prstGeom prst="roundRect">
               <a:avLst>
@@ -38029,7 +37941,7 @@
             </a:ln>
           </p:spPr>
           <p:txBody>
-            <a:bodyPr spcFirstLastPara="1" wrap="square" lIns="91424" tIns="91424" rIns="91424" bIns="91424" anchor="ctr" anchorCtr="0">
+            <a:bodyPr spcFirstLastPara="1" wrap="square" lIns="91423" tIns="91423" rIns="91423" bIns="91423" anchor="ctr" anchorCtr="0">
               <a:noAutofit/>
             </a:bodyPr>
             <a:lstStyle/>
@@ -38069,7 +37981,7 @@
           <p:spPr bwMode="auto">
             <a:xfrm flipH="0" flipV="0">
               <a:off x="1055716" y="0"/>
-              <a:ext cx="873034" cy="310300"/>
+              <a:ext cx="873034" cy="310299"/>
             </a:xfrm>
             <a:prstGeom prst="roundRect">
               <a:avLst>
@@ -38088,7 +38000,7 @@
             </a:ln>
           </p:spPr>
           <p:txBody>
-            <a:bodyPr spcFirstLastPara="1" wrap="square" lIns="91424" tIns="91424" rIns="91424" bIns="91424" anchor="ctr" anchorCtr="0">
+            <a:bodyPr spcFirstLastPara="1" wrap="square" lIns="91423" tIns="91423" rIns="91423" bIns="91423" anchor="ctr" anchorCtr="0">
               <a:noAutofit/>
             </a:bodyPr>
             <a:lstStyle/>
@@ -39035,7 +38947,7 @@
           </a:prstGeom>
         </p:spPr>
         <p:txBody>
-          <a:bodyPr spcFirstLastPara="1" wrap="square" lIns="91424" tIns="91424" rIns="91424" bIns="91424" anchor="ctr" anchorCtr="0">
+          <a:bodyPr spcFirstLastPara="1" wrap="square" lIns="91423" tIns="91423" rIns="91423" bIns="91423" anchor="ctr" anchorCtr="0">
             <a:noAutofit/>
           </a:bodyPr>
           <a:lstStyle/>
@@ -39112,7 +39024,7 @@
           </a:prstGeom>
         </p:spPr>
         <p:txBody>
-          <a:bodyPr spcFirstLastPara="1" wrap="square" lIns="91424" tIns="91424" rIns="91424" bIns="91424" anchor="ctr" anchorCtr="0">
+          <a:bodyPr spcFirstLastPara="1" wrap="square" lIns="91423" tIns="91423" rIns="91423" bIns="91423" anchor="ctr" anchorCtr="0">
             <a:noAutofit/>
           </a:bodyPr>
           <a:lstStyle/>
@@ -39552,7 +39464,7 @@
             </a:ln>
           </p:spPr>
           <p:txBody>
-            <a:bodyPr spcFirstLastPara="1" wrap="square" lIns="91424" tIns="91424" rIns="91424" bIns="91424" anchor="t" anchorCtr="0">
+            <a:bodyPr spcFirstLastPara="1" wrap="square" lIns="91423" tIns="91423" rIns="91423" bIns="91423" anchor="t" anchorCtr="0">
               <a:spAutoFit/>
             </a:bodyPr>
             <a:lstStyle/>
@@ -39599,7 +39511,7 @@
             <p:nvPr/>
           </p:nvCxnSpPr>
           <p:spPr bwMode="auto">
-            <a:xfrm rot="5399978" flipH="0" flipV="1">
+            <a:xfrm rot="5399977" flipH="0" flipV="1">
               <a:off x="-1044398" y="1297502"/>
               <a:ext cx="2595004" cy="0"/>
             </a:xfrm>
@@ -39862,7 +39774,7 @@
           </a:prstGeom>
         </p:spPr>
         <p:txBody>
-          <a:bodyPr spcFirstLastPara="1" wrap="square" lIns="91424" tIns="91424" rIns="91424" bIns="91424" anchor="ctr" anchorCtr="0">
+          <a:bodyPr spcFirstLastPara="1" wrap="square" lIns="91423" tIns="91423" rIns="91423" bIns="91423" anchor="ctr" anchorCtr="0">
             <a:noAutofit/>
           </a:bodyPr>
           <a:lstStyle/>
@@ -42532,7 +42444,7 @@
             </a:ln>
           </p:spPr>
           <p:txBody>
-            <a:bodyPr spcFirstLastPara="1" wrap="square" lIns="91424" tIns="91424" rIns="91424" bIns="91424" anchor="t" anchorCtr="0">
+            <a:bodyPr spcFirstLastPara="1" wrap="square" lIns="91423" tIns="91423" rIns="91423" bIns="91423" anchor="t" anchorCtr="0">
               <a:spAutoFit/>
             </a:bodyPr>
             <a:lstStyle/>
@@ -42632,7 +42544,7 @@
             </a:ln>
           </p:spPr>
           <p:txBody>
-            <a:bodyPr spcFirstLastPara="1" wrap="square" lIns="91424" tIns="91424" rIns="91424" bIns="91424" anchor="t" anchorCtr="0">
+            <a:bodyPr spcFirstLastPara="1" wrap="square" lIns="91423" tIns="91423" rIns="91423" bIns="91423" anchor="t" anchorCtr="0">
               <a:spAutoFit/>
             </a:bodyPr>
             <a:lstStyle/>
@@ -42677,7 +42589,7 @@
           </a:prstGeom>
         </p:spPr>
         <p:txBody>
-          <a:bodyPr spcFirstLastPara="1" wrap="square" lIns="91424" tIns="91424" rIns="91424" bIns="91424" anchor="ctr" anchorCtr="0">
+          <a:bodyPr spcFirstLastPara="1" wrap="square" lIns="91423" tIns="91423" rIns="91423" bIns="91423" anchor="ctr" anchorCtr="0">
             <a:noAutofit/>
           </a:bodyPr>
           <a:lstStyle/>
@@ -42805,7 +42717,7 @@
             <a:off x="1606824" y="2350278"/>
             <a:ext cx="506091" cy="426610"/>
             <a:chOff x="1665362" y="1706699"/>
-            <a:chExt cx="578324" cy="487499"/>
+            <a:chExt cx="578323" cy="487499"/>
           </a:xfrm>
         </p:grpSpPr>
         <p:sp>
@@ -42836,7 +42748,7 @@
             </a:ln>
           </p:spPr>
           <p:txBody>
-            <a:bodyPr spcFirstLastPara="1" wrap="square" lIns="91424" tIns="91424" rIns="91424" bIns="91424" anchor="ctr" anchorCtr="0">
+            <a:bodyPr spcFirstLastPara="1" wrap="square" lIns="91423" tIns="91423" rIns="91423" bIns="91423" anchor="ctr" anchorCtr="0">
               <a:noAutofit/>
             </a:bodyPr>
             <a:lstStyle/>
@@ -42883,7 +42795,7 @@
             </a:ln>
           </p:spPr>
           <p:txBody>
-            <a:bodyPr spcFirstLastPara="1" wrap="square" lIns="91424" tIns="91424" rIns="91424" bIns="91424" anchor="ctr" anchorCtr="0">
+            <a:bodyPr spcFirstLastPara="1" wrap="square" lIns="91423" tIns="91423" rIns="91423" bIns="91423" anchor="ctr" anchorCtr="0">
               <a:noAutofit/>
             </a:bodyPr>
             <a:lstStyle/>
@@ -42970,7 +42882,7 @@
             </a:ln>
           </p:spPr>
           <p:txBody>
-            <a:bodyPr spcFirstLastPara="1" wrap="square" lIns="91424" tIns="91424" rIns="91424" bIns="91424" anchor="ctr" anchorCtr="0">
+            <a:bodyPr spcFirstLastPara="1" wrap="square" lIns="91423" tIns="91423" rIns="91423" bIns="91423" anchor="ctr" anchorCtr="0">
               <a:noAutofit/>
             </a:bodyPr>
             <a:lstStyle/>
@@ -43042,7 +42954,7 @@
             </a:ln>
           </p:spPr>
           <p:txBody>
-            <a:bodyPr spcFirstLastPara="1" wrap="square" lIns="91424" tIns="91424" rIns="91424" bIns="91424" anchor="ctr" anchorCtr="0">
+            <a:bodyPr spcFirstLastPara="1" wrap="square" lIns="91423" tIns="91423" rIns="91423" bIns="91423" anchor="ctr" anchorCtr="0">
               <a:noAutofit/>
             </a:bodyPr>
             <a:lstStyle/>
@@ -43104,7 +43016,7 @@
             </a:ln>
           </p:spPr>
           <p:txBody>
-            <a:bodyPr spcFirstLastPara="1" wrap="square" lIns="91424" tIns="91424" rIns="91424" bIns="91424" anchor="ctr" anchorCtr="0">
+            <a:bodyPr spcFirstLastPara="1" wrap="square" lIns="91423" tIns="91423" rIns="91423" bIns="91423" anchor="ctr" anchorCtr="0">
               <a:noAutofit/>
             </a:bodyPr>
             <a:lstStyle/>
@@ -43166,7 +43078,7 @@
             </a:ln>
           </p:spPr>
           <p:txBody>
-            <a:bodyPr spcFirstLastPara="1" wrap="square" lIns="91424" tIns="91424" rIns="91424" bIns="91424" anchor="ctr" anchorCtr="0">
+            <a:bodyPr spcFirstLastPara="1" wrap="square" lIns="91423" tIns="91423" rIns="91423" bIns="91423" anchor="ctr" anchorCtr="0">
               <a:noAutofit/>
             </a:bodyPr>
             <a:lstStyle/>
@@ -43228,7 +43140,7 @@
             </a:ln>
           </p:spPr>
           <p:txBody>
-            <a:bodyPr spcFirstLastPara="1" wrap="square" lIns="91424" tIns="91424" rIns="91424" bIns="91424" anchor="ctr" anchorCtr="0">
+            <a:bodyPr spcFirstLastPara="1" wrap="square" lIns="91423" tIns="91423" rIns="91423" bIns="91423" anchor="ctr" anchorCtr="0">
               <a:noAutofit/>
             </a:bodyPr>
             <a:lstStyle/>
@@ -43301,7 +43213,7 @@
             </a:ln>
           </p:spPr>
           <p:txBody>
-            <a:bodyPr spcFirstLastPara="1" wrap="square" lIns="91424" tIns="91424" rIns="91424" bIns="91424" anchor="ctr" anchorCtr="0">
+            <a:bodyPr spcFirstLastPara="1" wrap="square" lIns="91423" tIns="91423" rIns="91423" bIns="91423" anchor="ctr" anchorCtr="0">
               <a:noAutofit/>
             </a:bodyPr>
             <a:lstStyle/>
@@ -43328,7 +43240,7 @@
           </p:nvSpPr>
           <p:spPr bwMode="auto">
             <a:xfrm>
-              <a:off x="193732" y="18425"/>
+              <a:off x="193731" y="18425"/>
               <a:ext cx="38045" cy="9349"/>
             </a:xfrm>
             <a:custGeom>
@@ -43367,7 +43279,7 @@
             </a:ln>
           </p:spPr>
           <p:txBody>
-            <a:bodyPr spcFirstLastPara="1" wrap="square" lIns="91424" tIns="91424" rIns="91424" bIns="91424" anchor="ctr" anchorCtr="0">
+            <a:bodyPr spcFirstLastPara="1" wrap="square" lIns="91423" tIns="91423" rIns="91423" bIns="91423" anchor="ctr" anchorCtr="0">
               <a:noAutofit/>
             </a:bodyPr>
             <a:lstStyle/>
@@ -43446,7 +43358,7 @@
             </a:ln>
           </p:spPr>
           <p:txBody>
-            <a:bodyPr spcFirstLastPara="1" wrap="square" lIns="91424" tIns="91424" rIns="91424" bIns="91424" anchor="ctr" anchorCtr="0">
+            <a:bodyPr spcFirstLastPara="1" wrap="square" lIns="91423" tIns="91423" rIns="91423" bIns="91423" anchor="ctr" anchorCtr="0">
               <a:noAutofit/>
             </a:bodyPr>
             <a:lstStyle/>
@@ -43582,7 +43494,7 @@
             </a:ln>
           </p:spPr>
           <p:txBody>
-            <a:bodyPr spcFirstLastPara="1" wrap="square" lIns="91424" tIns="91424" rIns="91424" bIns="91424" anchor="ctr" anchorCtr="0">
+            <a:bodyPr spcFirstLastPara="1" wrap="square" lIns="91423" tIns="91423" rIns="91423" bIns="91423" anchor="ctr" anchorCtr="0">
               <a:noAutofit/>
             </a:bodyPr>
             <a:lstStyle/>
@@ -43677,7 +43589,7 @@
             </a:ln>
           </p:spPr>
           <p:txBody>
-            <a:bodyPr spcFirstLastPara="1" wrap="square" lIns="91424" tIns="91424" rIns="91424" bIns="91424" anchor="ctr" anchorCtr="0">
+            <a:bodyPr spcFirstLastPara="1" wrap="square" lIns="91423" tIns="91423" rIns="91423" bIns="91423" anchor="ctr" anchorCtr="0">
               <a:noAutofit/>
             </a:bodyPr>
             <a:lstStyle/>
@@ -43772,7 +43684,7 @@
             </a:ln>
           </p:spPr>
           <p:txBody>
-            <a:bodyPr spcFirstLastPara="1" wrap="square" lIns="91424" tIns="91424" rIns="91424" bIns="91424" anchor="ctr" anchorCtr="0">
+            <a:bodyPr spcFirstLastPara="1" wrap="square" lIns="91423" tIns="91423" rIns="91423" bIns="91423" anchor="ctr" anchorCtr="0">
               <a:noAutofit/>
             </a:bodyPr>
             <a:lstStyle/>
@@ -43903,7 +43815,7 @@
             </a:ln>
           </p:spPr>
           <p:txBody>
-            <a:bodyPr spcFirstLastPara="1" wrap="square" lIns="91424" tIns="91424" rIns="91424" bIns="91424" anchor="ctr" anchorCtr="0">
+            <a:bodyPr spcFirstLastPara="1" wrap="square" lIns="91423" tIns="91423" rIns="91423" bIns="91423" anchor="ctr" anchorCtr="0">
               <a:noAutofit/>
             </a:bodyPr>
             <a:lstStyle/>
@@ -43974,7 +43886,7 @@
           </a:prstGeom>
         </p:spPr>
         <p:txBody>
-          <a:bodyPr spcFirstLastPara="1" wrap="square" lIns="91424" tIns="91424" rIns="91424" bIns="91424" anchor="ctr" anchorCtr="0">
+          <a:bodyPr spcFirstLastPara="1" wrap="square" lIns="91423" tIns="91423" rIns="91423" bIns="91423" anchor="ctr" anchorCtr="0">
             <a:noAutofit/>
           </a:bodyPr>
           <a:lstStyle/>
@@ -44076,7 +43988,7 @@
           </a:prstGeom>
         </p:spPr>
         <p:txBody>
-          <a:bodyPr spcFirstLastPara="1" wrap="square" lIns="91424" tIns="91424" rIns="91424" bIns="91424" anchor="ctr" anchorCtr="0">
+          <a:bodyPr spcFirstLastPara="1" wrap="square" lIns="91423" tIns="91423" rIns="91423" bIns="91423" anchor="ctr" anchorCtr="0">
             <a:noAutofit/>
           </a:bodyPr>
           <a:lstStyle/>
@@ -44784,7 +44696,7 @@
             </a:ln>
           </p:spPr>
           <p:txBody>
-            <a:bodyPr spcFirstLastPara="1" wrap="square" lIns="91424" tIns="91424" rIns="91424" bIns="91424" anchor="ctr" anchorCtr="0">
+            <a:bodyPr spcFirstLastPara="1" wrap="square" lIns="91423" tIns="91423" rIns="91423" bIns="91423" anchor="ctr" anchorCtr="0">
               <a:noAutofit/>
             </a:bodyPr>
             <a:lstStyle/>
@@ -44885,7 +44797,7 @@
             </a:ln>
           </p:spPr>
           <p:txBody>
-            <a:bodyPr spcFirstLastPara="1" wrap="square" lIns="91424" tIns="91424" rIns="91424" bIns="91424" anchor="ctr" anchorCtr="0">
+            <a:bodyPr spcFirstLastPara="1" wrap="square" lIns="91423" tIns="91423" rIns="91423" bIns="91423" anchor="ctr" anchorCtr="0">
               <a:noAutofit/>
             </a:bodyPr>
             <a:lstStyle/>
@@ -44986,7 +44898,7 @@
             </a:ln>
           </p:spPr>
           <p:txBody>
-            <a:bodyPr spcFirstLastPara="1" wrap="square" lIns="91424" tIns="91424" rIns="91424" bIns="91424" anchor="ctr" anchorCtr="0">
+            <a:bodyPr spcFirstLastPara="1" wrap="square" lIns="91423" tIns="91423" rIns="91423" bIns="91423" anchor="ctr" anchorCtr="0">
               <a:noAutofit/>
             </a:bodyPr>
             <a:lstStyle/>
@@ -45087,7 +44999,7 @@
             </a:ln>
           </p:spPr>
           <p:txBody>
-            <a:bodyPr spcFirstLastPara="1" wrap="square" lIns="91424" tIns="91424" rIns="91424" bIns="91424" anchor="ctr" anchorCtr="0">
+            <a:bodyPr spcFirstLastPara="1" wrap="square" lIns="91423" tIns="91423" rIns="91423" bIns="91423" anchor="ctr" anchorCtr="0">
               <a:noAutofit/>
             </a:bodyPr>
             <a:lstStyle/>
@@ -45188,7 +45100,7 @@
             </a:ln>
           </p:spPr>
           <p:txBody>
-            <a:bodyPr spcFirstLastPara="1" wrap="square" lIns="91424" tIns="91424" rIns="91424" bIns="91424" anchor="ctr" anchorCtr="0">
+            <a:bodyPr spcFirstLastPara="1" wrap="square" lIns="91423" tIns="91423" rIns="91423" bIns="91423" anchor="ctr" anchorCtr="0">
               <a:noAutofit/>
             </a:bodyPr>
             <a:lstStyle/>
@@ -45289,7 +45201,7 @@
             </a:ln>
           </p:spPr>
           <p:txBody>
-            <a:bodyPr spcFirstLastPara="1" wrap="square" lIns="91424" tIns="91424" rIns="91424" bIns="91424" anchor="ctr" anchorCtr="0">
+            <a:bodyPr spcFirstLastPara="1" wrap="square" lIns="91423" tIns="91423" rIns="91423" bIns="91423" anchor="ctr" anchorCtr="0">
               <a:noAutofit/>
             </a:bodyPr>
             <a:lstStyle/>
@@ -45433,7 +45345,7 @@
             </a:ln>
           </p:spPr>
           <p:txBody>
-            <a:bodyPr spcFirstLastPara="1" wrap="square" lIns="91424" tIns="91424" rIns="91424" bIns="91424" anchor="ctr" anchorCtr="0">
+            <a:bodyPr spcFirstLastPara="1" wrap="square" lIns="91423" tIns="91423" rIns="91423" bIns="91423" anchor="ctr" anchorCtr="0">
               <a:noAutofit/>
             </a:bodyPr>
             <a:lstStyle/>
@@ -45577,7 +45489,7 @@
             </a:ln>
           </p:spPr>
           <p:txBody>
-            <a:bodyPr spcFirstLastPara="1" wrap="square" lIns="91424" tIns="91424" rIns="91424" bIns="91424" anchor="ctr" anchorCtr="0">
+            <a:bodyPr spcFirstLastPara="1" wrap="square" lIns="91423" tIns="91423" rIns="91423" bIns="91423" anchor="ctr" anchorCtr="0">
               <a:noAutofit/>
             </a:bodyPr>
             <a:lstStyle/>
@@ -45721,7 +45633,7 @@
             </a:ln>
           </p:spPr>
           <p:txBody>
-            <a:bodyPr spcFirstLastPara="1" wrap="square" lIns="91424" tIns="91424" rIns="91424" bIns="91424" anchor="ctr" anchorCtr="0">
+            <a:bodyPr spcFirstLastPara="1" wrap="square" lIns="91423" tIns="91423" rIns="91423" bIns="91423" anchor="ctr" anchorCtr="0">
               <a:noAutofit/>
             </a:bodyPr>
             <a:lstStyle/>
@@ -46558,7 +46470,7 @@
           </a:ln>
         </p:spPr>
         <p:txBody>
-          <a:bodyPr spcFirstLastPara="1" wrap="square" lIns="91424" tIns="91424" rIns="91424" bIns="91424" anchor="ctr" anchorCtr="0">
+          <a:bodyPr spcFirstLastPara="1" wrap="square" lIns="91423" tIns="91423" rIns="91423" bIns="91423" anchor="ctr" anchorCtr="0">
             <a:noAutofit/>
           </a:bodyPr>
           <a:lstStyle/>
@@ -46593,7 +46505,7 @@
           </a:prstGeom>
         </p:spPr>
         <p:txBody>
-          <a:bodyPr spcFirstLastPara="1" wrap="square" lIns="91424" tIns="91424" rIns="91424" bIns="91424" anchor="ctr" anchorCtr="0">
+          <a:bodyPr spcFirstLastPara="1" wrap="square" lIns="91423" tIns="91423" rIns="91423" bIns="91423" anchor="ctr" anchorCtr="0">
             <a:noAutofit/>
           </a:bodyPr>
           <a:lstStyle>
@@ -46875,10 +46787,10 @@
         </p:nvGrpSpPr>
         <p:grpSpPr bwMode="auto">
           <a:xfrm>
-            <a:off x="2561675" y="3597275"/>
-            <a:ext cx="578324" cy="487499"/>
+            <a:off x="2561675" y="3597274"/>
+            <a:ext cx="578323" cy="487499"/>
             <a:chOff x="2099174" y="3289449"/>
-            <a:chExt cx="578324" cy="487499"/>
+            <a:chExt cx="578323" cy="487499"/>
           </a:xfrm>
         </p:grpSpPr>
         <p:sp>
@@ -46909,7 +46821,7 @@
             </a:ln>
           </p:spPr>
           <p:txBody>
-            <a:bodyPr spcFirstLastPara="1" wrap="square" lIns="91424" tIns="91424" rIns="91424" bIns="91424" anchor="ctr" anchorCtr="0">
+            <a:bodyPr spcFirstLastPara="1" wrap="square" lIns="91423" tIns="91423" rIns="91423" bIns="91423" anchor="ctr" anchorCtr="0">
               <a:noAutofit/>
             </a:bodyPr>
             <a:lstStyle/>
@@ -46956,7 +46868,7 @@
             </a:ln>
           </p:spPr>
           <p:txBody>
-            <a:bodyPr spcFirstLastPara="1" wrap="square" lIns="91424" tIns="91424" rIns="91424" bIns="91424" anchor="ctr" anchorCtr="0">
+            <a:bodyPr spcFirstLastPara="1" wrap="square" lIns="91423" tIns="91423" rIns="91423" bIns="91423" anchor="ctr" anchorCtr="0">
               <a:noAutofit/>
             </a:bodyPr>
             <a:lstStyle/>
@@ -47072,7 +46984,7 @@
             </a:ln>
           </p:spPr>
           <p:txBody>
-            <a:bodyPr spcFirstLastPara="1" wrap="square" lIns="91424" tIns="91424" rIns="91424" bIns="91424" anchor="ctr" anchorCtr="0">
+            <a:bodyPr spcFirstLastPara="1" wrap="square" lIns="91423" tIns="91423" rIns="91423" bIns="91423" anchor="ctr" anchorCtr="0">
               <a:noAutofit/>
             </a:bodyPr>
             <a:lstStyle/>
@@ -47174,7 +47086,7 @@
             </a:ln>
           </p:spPr>
           <p:txBody>
-            <a:bodyPr spcFirstLastPara="1" wrap="square" lIns="91424" tIns="91424" rIns="91424" bIns="91424" anchor="ctr" anchorCtr="0">
+            <a:bodyPr spcFirstLastPara="1" wrap="square" lIns="91423" tIns="91423" rIns="91423" bIns="91423" anchor="ctr" anchorCtr="0">
               <a:noAutofit/>
             </a:bodyPr>
             <a:lstStyle/>
@@ -47391,7 +47303,7 @@
           </a:ln>
         </p:spPr>
         <p:txBody>
-          <a:bodyPr spcFirstLastPara="1" wrap="square" lIns="91424" tIns="91424" rIns="91424" bIns="91424" anchor="ctr" anchorCtr="0">
+          <a:bodyPr spcFirstLastPara="1" wrap="square" lIns="91423" tIns="91423" rIns="91423" bIns="91423" anchor="ctr" anchorCtr="0">
             <a:noAutofit/>
           </a:bodyPr>
           <a:lstStyle/>
@@ -47448,7 +47360,7 @@
           </a:ln>
         </p:spPr>
         <p:txBody>
-          <a:bodyPr spcFirstLastPara="1" wrap="square" lIns="91424" tIns="91424" rIns="91424" bIns="91424" anchor="ctr" anchorCtr="0">
+          <a:bodyPr spcFirstLastPara="1" wrap="square" lIns="91423" tIns="91423" rIns="91423" bIns="91423" anchor="ctr" anchorCtr="0">
             <a:noAutofit/>
           </a:bodyPr>
           <a:lstStyle/>
@@ -47561,7 +47473,7 @@
           </a:ln>
         </p:spPr>
         <p:txBody>
-          <a:bodyPr spcFirstLastPara="1" wrap="square" lIns="91424" tIns="91424" rIns="91424" bIns="91424" anchor="ctr" anchorCtr="0">
+          <a:bodyPr spcFirstLastPara="1" wrap="square" lIns="91423" tIns="91423" rIns="91423" bIns="91423" anchor="ctr" anchorCtr="0">
             <a:noAutofit/>
           </a:bodyPr>
           <a:lstStyle/>
@@ -47754,7 +47666,7 @@
           <p:nvPr/>
         </p:nvCxnSpPr>
         <p:spPr bwMode="auto">
-          <a:xfrm rot="5399978" flipH="0" flipV="0">
+          <a:xfrm rot="5399977" flipH="0" flipV="0">
             <a:off x="768195" y="1764266"/>
             <a:ext cx="1139358" cy="0"/>
           </a:xfrm>

</xml_diff>